<commit_message>
Add first version of caching article part 1
</commit_message>
<xml_diff>
--- a/presentations/deployment.pptx
+++ b/presentations/deployment.pptx
@@ -227,7 +227,7 @@
           <a:p>
             <a:fld id="{4A038DE9-0E8E-854D-B82A-A3435CF8E78D}" type="datetimeFigureOut">
               <a:rPr lang="en-US" smtClean="0"/>
-              <a:t>3/5/19</a:t>
+              <a:t>2/13/22</a:t>
             </a:fld>
             <a:endParaRPr lang="en-US"/>
           </a:p>
@@ -622,7 +622,7 @@
           <a:bodyPr/>
           <a:lstStyle/>
           <a:p>
-            <a:endParaRPr lang="en-US" dirty="0"/>
+            <a:endParaRPr lang="en-NL" dirty="0"/>
           </a:p>
         </p:txBody>
       </p:sp>
@@ -643,7 +643,7 @@
           <a:p>
             <a:fld id="{35EB60C3-1443-504A-9B09-64D902365843}" type="slidenum">
               <a:rPr lang="en-US" smtClean="0"/>
-              <a:t>4</a:t>
+              <a:t>3</a:t>
             </a:fld>
             <a:endParaRPr lang="en-US"/>
           </a:p>
@@ -652,7 +652,7 @@
     </p:spTree>
     <p:extLst>
       <p:ext uri="{BB962C8B-B14F-4D97-AF65-F5344CB8AC3E}">
-        <p14:creationId xmlns:p14="http://schemas.microsoft.com/office/powerpoint/2010/main" val="1908269597"/>
+        <p14:creationId xmlns:p14="http://schemas.microsoft.com/office/powerpoint/2010/main" val="1209159322"/>
       </p:ext>
     </p:extLst>
   </p:cSld>
@@ -727,6 +727,90 @@
           <a:p>
             <a:fld id="{35EB60C3-1443-504A-9B09-64D902365843}" type="slidenum">
               <a:rPr lang="en-US" smtClean="0"/>
+              <a:t>4</a:t>
+            </a:fld>
+            <a:endParaRPr lang="en-US"/>
+          </a:p>
+        </p:txBody>
+      </p:sp>
+    </p:spTree>
+    <p:extLst>
+      <p:ext uri="{BB962C8B-B14F-4D97-AF65-F5344CB8AC3E}">
+        <p14:creationId xmlns:p14="http://schemas.microsoft.com/office/powerpoint/2010/main" val="1908269597"/>
+      </p:ext>
+    </p:extLst>
+  </p:cSld>
+  <p:clrMapOvr>
+    <a:masterClrMapping/>
+  </p:clrMapOvr>
+</p:notes>
+</file>
+
+<file path=ppt/notesSlides/notesSlide4.xml><?xml version="1.0" encoding="utf-8"?>
+<p:notes xmlns:a="http://schemas.openxmlformats.org/drawingml/2006/main" xmlns:r="http://schemas.openxmlformats.org/officeDocument/2006/relationships" xmlns:p="http://schemas.openxmlformats.org/presentationml/2006/main">
+  <p:cSld>
+    <p:spTree>
+      <p:nvGrpSpPr>
+        <p:cNvPr id="1" name=""/>
+        <p:cNvGrpSpPr/>
+        <p:nvPr/>
+      </p:nvGrpSpPr>
+      <p:grpSpPr>
+        <a:xfrm>
+          <a:off x="0" y="0"/>
+          <a:ext cx="0" cy="0"/>
+          <a:chOff x="0" y="0"/>
+          <a:chExt cx="0" cy="0"/>
+        </a:xfrm>
+      </p:grpSpPr>
+      <p:sp>
+        <p:nvSpPr>
+          <p:cNvPr id="2" name="Slide Image Placeholder 1"/>
+          <p:cNvSpPr>
+            <a:spLocks noGrp="1" noRot="1" noChangeAspect="1"/>
+          </p:cNvSpPr>
+          <p:nvPr>
+            <p:ph type="sldImg"/>
+          </p:nvPr>
+        </p:nvSpPr>
+        <p:spPr/>
+      </p:sp>
+      <p:sp>
+        <p:nvSpPr>
+          <p:cNvPr id="3" name="Notes Placeholder 2"/>
+          <p:cNvSpPr>
+            <a:spLocks noGrp="1"/>
+          </p:cNvSpPr>
+          <p:nvPr>
+            <p:ph type="body" idx="1"/>
+          </p:nvPr>
+        </p:nvSpPr>
+        <p:spPr/>
+        <p:txBody>
+          <a:bodyPr/>
+          <a:lstStyle/>
+          <a:p>
+            <a:endParaRPr lang="en-US" dirty="0"/>
+          </a:p>
+        </p:txBody>
+      </p:sp>
+      <p:sp>
+        <p:nvSpPr>
+          <p:cNvPr id="4" name="Slide Number Placeholder 3"/>
+          <p:cNvSpPr>
+            <a:spLocks noGrp="1"/>
+          </p:cNvSpPr>
+          <p:nvPr>
+            <p:ph type="sldNum" sz="quarter" idx="5"/>
+          </p:nvPr>
+        </p:nvSpPr>
+        <p:spPr/>
+        <p:txBody>
+          <a:bodyPr/>
+          <a:lstStyle/>
+          <a:p>
+            <a:fld id="{35EB60C3-1443-504A-9B09-64D902365843}" type="slidenum">
+              <a:rPr lang="en-US" smtClean="0"/>
               <a:t>5</a:t>
             </a:fld>
             <a:endParaRPr lang="en-US"/>
@@ -746,7 +830,7 @@
 </p:notes>
 </file>
 
-<file path=ppt/notesSlides/notesSlide4.xml><?xml version="1.0" encoding="utf-8"?>
+<file path=ppt/notesSlides/notesSlide5.xml><?xml version="1.0" encoding="utf-8"?>
 <p:notes xmlns:a="http://schemas.openxmlformats.org/drawingml/2006/main" xmlns:r="http://schemas.openxmlformats.org/officeDocument/2006/relationships" xmlns:p="http://schemas.openxmlformats.org/presentationml/2006/main">
   <p:cSld>
     <p:spTree>
@@ -977,7 +1061,7 @@
           <a:p>
             <a:fld id="{1301590A-E159-674E-8235-670D9DF1FE92}" type="datetimeFigureOut">
               <a:rPr lang="en-US" smtClean="0"/>
-              <a:t>3/5/19</a:t>
+              <a:t>2/13/22</a:t>
             </a:fld>
             <a:endParaRPr lang="en-US"/>
           </a:p>
@@ -1179,7 +1263,7 @@
           <a:p>
             <a:fld id="{1301590A-E159-674E-8235-670D9DF1FE92}" type="datetimeFigureOut">
               <a:rPr lang="en-US" smtClean="0"/>
-              <a:t>3/5/19</a:t>
+              <a:t>2/13/22</a:t>
             </a:fld>
             <a:endParaRPr lang="en-US"/>
           </a:p>
@@ -1387,7 +1471,7 @@
           <a:p>
             <a:fld id="{1301590A-E159-674E-8235-670D9DF1FE92}" type="datetimeFigureOut">
               <a:rPr lang="en-US" smtClean="0"/>
-              <a:t>3/5/19</a:t>
+              <a:t>2/13/22</a:t>
             </a:fld>
             <a:endParaRPr lang="en-US"/>
           </a:p>
@@ -1585,7 +1669,7 @@
           <a:p>
             <a:fld id="{1301590A-E159-674E-8235-670D9DF1FE92}" type="datetimeFigureOut">
               <a:rPr lang="en-US" smtClean="0"/>
-              <a:t>3/5/19</a:t>
+              <a:t>2/13/22</a:t>
             </a:fld>
             <a:endParaRPr lang="en-US"/>
           </a:p>
@@ -1860,7 +1944,7 @@
           <a:p>
             <a:fld id="{1301590A-E159-674E-8235-670D9DF1FE92}" type="datetimeFigureOut">
               <a:rPr lang="en-US" smtClean="0"/>
-              <a:t>3/5/19</a:t>
+              <a:t>2/13/22</a:t>
             </a:fld>
             <a:endParaRPr lang="en-US"/>
           </a:p>
@@ -2125,7 +2209,7 @@
           <a:p>
             <a:fld id="{1301590A-E159-674E-8235-670D9DF1FE92}" type="datetimeFigureOut">
               <a:rPr lang="en-US" smtClean="0"/>
-              <a:t>3/5/19</a:t>
+              <a:t>2/13/22</a:t>
             </a:fld>
             <a:endParaRPr lang="en-US"/>
           </a:p>
@@ -2537,7 +2621,7 @@
           <a:p>
             <a:fld id="{1301590A-E159-674E-8235-670D9DF1FE92}" type="datetimeFigureOut">
               <a:rPr lang="en-US" smtClean="0"/>
-              <a:t>3/5/19</a:t>
+              <a:t>2/13/22</a:t>
             </a:fld>
             <a:endParaRPr lang="en-US"/>
           </a:p>
@@ -2678,7 +2762,7 @@
           <a:p>
             <a:fld id="{1301590A-E159-674E-8235-670D9DF1FE92}" type="datetimeFigureOut">
               <a:rPr lang="en-US" smtClean="0"/>
-              <a:t>3/5/19</a:t>
+              <a:t>2/13/22</a:t>
             </a:fld>
             <a:endParaRPr lang="en-US"/>
           </a:p>
@@ -2791,7 +2875,7 @@
           <a:p>
             <a:fld id="{1301590A-E159-674E-8235-670D9DF1FE92}" type="datetimeFigureOut">
               <a:rPr lang="en-US" smtClean="0"/>
-              <a:t>3/5/19</a:t>
+              <a:t>2/13/22</a:t>
             </a:fld>
             <a:endParaRPr lang="en-US"/>
           </a:p>
@@ -3102,7 +3186,7 @@
           <a:p>
             <a:fld id="{1301590A-E159-674E-8235-670D9DF1FE92}" type="datetimeFigureOut">
               <a:rPr lang="en-US" smtClean="0"/>
-              <a:t>3/5/19</a:t>
+              <a:t>2/13/22</a:t>
             </a:fld>
             <a:endParaRPr lang="en-US"/>
           </a:p>
@@ -3390,7 +3474,7 @@
           <a:p>
             <a:fld id="{1301590A-E159-674E-8235-670D9DF1FE92}" type="datetimeFigureOut">
               <a:rPr lang="en-US" smtClean="0"/>
-              <a:t>3/5/19</a:t>
+              <a:t>2/13/22</a:t>
             </a:fld>
             <a:endParaRPr lang="en-US"/>
           </a:p>
@@ -3631,7 +3715,7 @@
           <a:p>
             <a:fld id="{1301590A-E159-674E-8235-670D9DF1FE92}" type="datetimeFigureOut">
               <a:rPr lang="en-US" smtClean="0"/>
-              <a:t>3/5/19</a:t>
+              <a:t>2/13/22</a:t>
             </a:fld>
             <a:endParaRPr lang="en-US"/>
           </a:p>
@@ -13483,31 +13567,6 @@
           </p:style>
         </p:cxnSp>
       </p:grpSp>
-      <p:sp>
-        <p:nvSpPr>
-          <p:cNvPr id="13" name="Content Placeholder 12">
-            <a:extLst>
-              <a:ext uri="{FF2B5EF4-FFF2-40B4-BE49-F238E27FC236}">
-                <a16:creationId xmlns:a16="http://schemas.microsoft.com/office/drawing/2014/main" id="{38040931-245F-2948-8F20-3072F0BDC24A}"/>
-              </a:ext>
-            </a:extLst>
-          </p:cNvPr>
-          <p:cNvSpPr>
-            <a:spLocks noGrp="1"/>
-          </p:cNvSpPr>
-          <p:nvPr>
-            <p:ph idx="1"/>
-          </p:nvPr>
-        </p:nvSpPr>
-        <p:spPr/>
-        <p:txBody>
-          <a:bodyPr/>
-          <a:lstStyle/>
-          <a:p>
-            <a:endParaRPr lang="en-US"/>
-          </a:p>
-        </p:txBody>
-      </p:sp>
     </p:spTree>
     <p:extLst>
       <p:ext uri="{BB962C8B-B14F-4D97-AF65-F5344CB8AC3E}">

</xml_diff>